<commit_message>
Added WD twitter handle to the pptx
</commit_message>
<xml_diff>
--- a/Powerpoint/WDTemplate.pptx
+++ b/Powerpoint/WDTemplate.pptx
@@ -208,7 +208,7 @@
           <a:p>
             <a:fld id="{1D17DF41-73E1-4D1D-8ECB-F2291FB73975}" type="datetimeFigureOut">
               <a:rPr lang="en-US" smtClean="0"/>
-              <a:t>9/12/2015</a:t>
+              <a:t>9/19/2015</a:t>
             </a:fld>
             <a:endParaRPr lang="en-US"/>
           </a:p>
@@ -1147,7 +1147,7 @@
             <a:fld id="{B61BEF0D-F0BB-DE4B-95CE-6DB70DBA9567}" type="datetimeFigureOut">
               <a:rPr lang="en-US" smtClean="0"/>
               <a:pPr/>
-              <a:t>9/12/2015</a:t>
+              <a:t>9/19/2015</a:t>
             </a:fld>
             <a:endParaRPr lang="en-US" dirty="0"/>
           </a:p>
@@ -1445,7 +1445,7 @@
             <a:fld id="{B61BEF0D-F0BB-DE4B-95CE-6DB70DBA9567}" type="datetimeFigureOut">
               <a:rPr lang="en-US" smtClean="0"/>
               <a:pPr/>
-              <a:t>9/12/2015</a:t>
+              <a:t>9/19/2015</a:t>
             </a:fld>
             <a:endParaRPr lang="en-US" dirty="0"/>
           </a:p>
@@ -1695,7 +1695,7 @@
             <a:fld id="{B61BEF0D-F0BB-DE4B-95CE-6DB70DBA9567}" type="datetimeFigureOut">
               <a:rPr lang="en-US" smtClean="0"/>
               <a:pPr/>
-              <a:t>9/12/2015</a:t>
+              <a:t>9/19/2015</a:t>
             </a:fld>
             <a:endParaRPr lang="en-US" dirty="0"/>
           </a:p>
@@ -2237,7 +2237,7 @@
             <a:fld id="{B61BEF0D-F0BB-DE4B-95CE-6DB70DBA9567}" type="datetimeFigureOut">
               <a:rPr lang="en-US" smtClean="0"/>
               <a:pPr/>
-              <a:t>9/12/2015</a:t>
+              <a:t>9/19/2015</a:t>
             </a:fld>
             <a:endParaRPr lang="en-US" dirty="0"/>
           </a:p>
@@ -2487,7 +2487,7 @@
             <a:fld id="{B61BEF0D-F0BB-DE4B-95CE-6DB70DBA9567}" type="datetimeFigureOut">
               <a:rPr lang="en-US" smtClean="0"/>
               <a:pPr/>
-              <a:t>9/12/2015</a:t>
+              <a:t>9/19/2015</a:t>
             </a:fld>
             <a:endParaRPr lang="en-US" dirty="0"/>
           </a:p>
@@ -3021,7 +3021,7 @@
             <a:fld id="{B61BEF0D-F0BB-DE4B-95CE-6DB70DBA9567}" type="datetimeFigureOut">
               <a:rPr lang="en-US" smtClean="0"/>
               <a:pPr/>
-              <a:t>9/12/2015</a:t>
+              <a:t>9/19/2015</a:t>
             </a:fld>
             <a:endParaRPr lang="en-US" dirty="0"/>
           </a:p>
@@ -3320,7 +3320,7 @@
             <a:fld id="{B61BEF0D-F0BB-DE4B-95CE-6DB70DBA9567}" type="datetimeFigureOut">
               <a:rPr lang="en-US" smtClean="0"/>
               <a:pPr/>
-              <a:t>9/12/2015</a:t>
+              <a:t>9/19/2015</a:t>
             </a:fld>
             <a:endParaRPr lang="en-US" dirty="0"/>
           </a:p>
@@ -3496,7 +3496,7 @@
             <a:fld id="{B61BEF0D-F0BB-DE4B-95CE-6DB70DBA9567}" type="datetimeFigureOut">
               <a:rPr lang="en-US" smtClean="0"/>
               <a:pPr/>
-              <a:t>9/12/2015</a:t>
+              <a:t>9/19/2015</a:t>
             </a:fld>
             <a:endParaRPr lang="en-US" dirty="0"/>
           </a:p>
@@ -3678,7 +3678,7 @@
             <a:fld id="{B61BEF0D-F0BB-DE4B-95CE-6DB70DBA9567}" type="datetimeFigureOut">
               <a:rPr lang="en-US" smtClean="0"/>
               <a:pPr/>
-              <a:t>9/12/2015</a:t>
+              <a:t>9/19/2015</a:t>
             </a:fld>
             <a:endParaRPr lang="en-US" dirty="0"/>
           </a:p>
@@ -3850,7 +3850,7 @@
             <a:fld id="{B61BEF0D-F0BB-DE4B-95CE-6DB70DBA9567}" type="datetimeFigureOut">
               <a:rPr lang="en-US" smtClean="0"/>
               <a:pPr/>
-              <a:t>9/12/2015</a:t>
+              <a:t>9/19/2015</a:t>
             </a:fld>
             <a:endParaRPr lang="en-US" dirty="0"/>
           </a:p>
@@ -4103,7 +4103,7 @@
             <a:fld id="{B61BEF0D-F0BB-DE4B-95CE-6DB70DBA9567}" type="datetimeFigureOut">
               <a:rPr lang="en-US" smtClean="0"/>
               <a:pPr/>
-              <a:t>9/12/2015</a:t>
+              <a:t>9/19/2015</a:t>
             </a:fld>
             <a:endParaRPr lang="en-US" dirty="0"/>
           </a:p>
@@ -4402,7 +4402,7 @@
             <a:fld id="{B61BEF0D-F0BB-DE4B-95CE-6DB70DBA9567}" type="datetimeFigureOut">
               <a:rPr lang="en-US" smtClean="0"/>
               <a:pPr/>
-              <a:t>9/12/2015</a:t>
+              <a:t>9/19/2015</a:t>
             </a:fld>
             <a:endParaRPr lang="en-US" dirty="0"/>
           </a:p>
@@ -4846,7 +4846,7 @@
             <a:fld id="{B61BEF0D-F0BB-DE4B-95CE-6DB70DBA9567}" type="datetimeFigureOut">
               <a:rPr lang="en-US" smtClean="0"/>
               <a:pPr/>
-              <a:t>9/12/2015</a:t>
+              <a:t>9/19/2015</a:t>
             </a:fld>
             <a:endParaRPr lang="en-US" dirty="0"/>
           </a:p>
@@ -4966,7 +4966,7 @@
             <a:fld id="{B61BEF0D-F0BB-DE4B-95CE-6DB70DBA9567}" type="datetimeFigureOut">
               <a:rPr lang="en-US" smtClean="0"/>
               <a:pPr/>
-              <a:t>9/12/2015</a:t>
+              <a:t>9/19/2015</a:t>
             </a:fld>
             <a:endParaRPr lang="en-US" dirty="0"/>
           </a:p>
@@ -5063,7 +5063,7 @@
             <a:fld id="{B61BEF0D-F0BB-DE4B-95CE-6DB70DBA9567}" type="datetimeFigureOut">
               <a:rPr lang="en-US" smtClean="0"/>
               <a:pPr/>
-              <a:t>9/12/2015</a:t>
+              <a:t>9/19/2015</a:t>
             </a:fld>
             <a:endParaRPr lang="en-US" dirty="0"/>
           </a:p>
@@ -5348,7 +5348,7 @@
             <a:fld id="{B61BEF0D-F0BB-DE4B-95CE-6DB70DBA9567}" type="datetimeFigureOut">
               <a:rPr lang="en-US" smtClean="0"/>
               <a:pPr/>
-              <a:t>9/12/2015</a:t>
+              <a:t>9/19/2015</a:t>
             </a:fld>
             <a:endParaRPr lang="en-US" dirty="0"/>
           </a:p>
@@ -5641,7 +5641,7 @@
             <a:fld id="{B61BEF0D-F0BB-DE4B-95CE-6DB70DBA9567}" type="datetimeFigureOut">
               <a:rPr lang="en-US" smtClean="0"/>
               <a:pPr/>
-              <a:t>9/12/2015</a:t>
+              <a:t>9/19/2015</a:t>
             </a:fld>
             <a:endParaRPr lang="en-US" dirty="0"/>
           </a:p>
@@ -6173,7 +6173,7 @@
             <a:fld id="{B61BEF0D-F0BB-DE4B-95CE-6DB70DBA9567}" type="datetimeFigureOut">
               <a:rPr lang="en-US" smtClean="0"/>
               <a:pPr/>
-              <a:t>9/12/2015</a:t>
+              <a:t>9/19/2015</a:t>
             </a:fld>
             <a:endParaRPr lang="en-US" dirty="0"/>
           </a:p>
@@ -6751,7 +6751,6 @@
               <a:rPr lang="en-US" dirty="0" smtClean="0"/>
               <a:t>Your Name</a:t>
             </a:r>
-            <a:endParaRPr lang="en-US" dirty="0" smtClean="0"/>
           </a:p>
           <a:p>
             <a:r>
@@ -6764,7 +6763,6 @@
               <a:rPr lang="en-US" dirty="0" smtClean="0"/>
               <a:t> </a:t>
             </a:r>
-            <a:endParaRPr lang="en-US" dirty="0" smtClean="0"/>
           </a:p>
           <a:p>
             <a:r>
@@ -6844,7 +6842,6 @@
               <a:rPr lang="en-US" sz="2400" dirty="0" smtClean="0"/>
               <a:t>www.yoursite.com</a:t>
             </a:r>
-            <a:endParaRPr lang="en-US" sz="2400" dirty="0" smtClean="0"/>
           </a:p>
         </p:txBody>
       </p:sp>
@@ -6978,7 +6975,7 @@
         <p:spPr>
           <a:xfrm>
             <a:off x="1120148" y="4848606"/>
-            <a:ext cx="5000878" cy="584775"/>
+            <a:ext cx="5000878" cy="1077218"/>
           </a:xfrm>
           <a:prstGeom prst="rect">
             <a:avLst/>
@@ -6998,6 +6995,25 @@
                 </a:solidFill>
               </a:rPr>
               <a:t>www.westerndevs.com</a:t>
+            </a:r>
+          </a:p>
+          <a:p>
+            <a:pPr algn="ctr"/>
+            <a:r>
+              <a:rPr lang="en-US" sz="3200" dirty="0" smtClean="0">
+                <a:solidFill>
+                  <a:srgbClr val="002060"/>
+                </a:solidFill>
+              </a:rPr>
+              <a:t>@</a:t>
+            </a:r>
+            <a:r>
+              <a:rPr lang="en-US" sz="3200" dirty="0" err="1" smtClean="0">
+                <a:solidFill>
+                  <a:srgbClr val="002060"/>
+                </a:solidFill>
+              </a:rPr>
+              <a:t>westerndevs</a:t>
             </a:r>
             <a:endParaRPr lang="en-US" sz="2800" dirty="0" smtClean="0">
               <a:solidFill>
@@ -7060,7 +7076,6 @@
               <a:rPr lang="en-US" sz="2400" dirty="0" smtClean="0"/>
               <a:t>your@email.com</a:t>
             </a:r>
-            <a:endParaRPr lang="en-US" sz="2400" dirty="0" smtClean="0"/>
           </a:p>
         </p:txBody>
       </p:sp>

</xml_diff>